<commit_message>
exported presentation as pdf
</commit_message>
<xml_diff>
--- a/2024.01.16 LLM Reviewer.pptx
+++ b/2024.01.16 LLM Reviewer.pptx
@@ -5,7 +5,7 @@
     <p:sldMasterId id="2147483648" r:id="rId1"/>
   </p:sldMasterIdLst>
   <p:notesMasterIdLst>
-    <p:notesMasterId r:id="rId16"/>
+    <p:notesMasterId r:id="rId15"/>
   </p:notesMasterIdLst>
   <p:sldIdLst>
     <p:sldId id="256" r:id="rId2"/>
@@ -21,7 +21,6 @@
     <p:sldId id="266" r:id="rId12"/>
     <p:sldId id="258" r:id="rId13"/>
     <p:sldId id="259" r:id="rId14"/>
-    <p:sldId id="261" r:id="rId15"/>
   </p:sldIdLst>
   <p:sldSz cx="12192000" cy="6858000"/>
   <p:notesSz cx="6858000" cy="9144000"/>
@@ -158,7 +157,6 @@
           <p14:sldIdLst>
             <p14:sldId id="258"/>
             <p14:sldId id="259"/>
-            <p14:sldId id="261"/>
           </p14:sldIdLst>
         </p14:section>
       </p14:sectionLst>
@@ -864,6 +862,30 @@
     </pc:docChg>
   </pc:docChgLst>
   <pc:docChgLst>
+    <pc:chgData name="Stefan Horak" userId="e2bae3e58e102d1b" providerId="Windows Live" clId="Web-{9CFEFA10-5DCA-4815-A16B-90188ED57584}"/>
+    <pc:docChg chg="modSld">
+      <pc:chgData name="Stefan Horak" userId="e2bae3e58e102d1b" providerId="Windows Live" clId="Web-{9CFEFA10-5DCA-4815-A16B-90188ED57584}" dt="2024-01-16T10:49:36.872" v="55" actId="20577"/>
+      <pc:docMkLst>
+        <pc:docMk/>
+      </pc:docMkLst>
+      <pc:sldChg chg="modSp">
+        <pc:chgData name="Stefan Horak" userId="e2bae3e58e102d1b" providerId="Windows Live" clId="Web-{9CFEFA10-5DCA-4815-A16B-90188ED57584}" dt="2024-01-16T10:49:36.872" v="55" actId="20577"/>
+        <pc:sldMkLst>
+          <pc:docMk/>
+          <pc:sldMk cId="3769825779" sldId="262"/>
+        </pc:sldMkLst>
+        <pc:spChg chg="mod">
+          <ac:chgData name="Stefan Horak" userId="e2bae3e58e102d1b" providerId="Windows Live" clId="Web-{9CFEFA10-5DCA-4815-A16B-90188ED57584}" dt="2024-01-16T10:49:36.872" v="55" actId="20577"/>
+          <ac:spMkLst>
+            <pc:docMk/>
+            <pc:sldMk cId="3769825779" sldId="262"/>
+            <ac:spMk id="2" creationId="{A1FC906E-4D88-D885-CE12-463ED76A5457}"/>
+          </ac:spMkLst>
+        </pc:spChg>
+      </pc:sldChg>
+    </pc:docChg>
+  </pc:docChgLst>
+  <pc:docChgLst>
     <pc:chgData name="Yorck Zisgen" userId="c846bb175226ae33" providerId="Windows Live" clId="Web-{F477B971-D884-43EC-ACDD-E286143AF999}"/>
     <pc:docChg chg="addSld delSld modSld sldOrd">
       <pc:chgData name="Yorck Zisgen" userId="c846bb175226ae33" providerId="Windows Live" clId="Web-{F477B971-D884-43EC-ACDD-E286143AF999}" dt="2024-01-15T17:29:22.370" v="782"/>
@@ -1269,30 +1291,6 @@
       </pc:sldChg>
     </pc:docChg>
   </pc:docChgLst>
-  <pc:docChgLst>
-    <pc:chgData name="Stefan Horak" userId="e2bae3e58e102d1b" providerId="Windows Live" clId="Web-{9CFEFA10-5DCA-4815-A16B-90188ED57584}"/>
-    <pc:docChg chg="modSld">
-      <pc:chgData name="Stefan Horak" userId="e2bae3e58e102d1b" providerId="Windows Live" clId="Web-{9CFEFA10-5DCA-4815-A16B-90188ED57584}" dt="2024-01-16T10:49:36.872" v="55" actId="20577"/>
-      <pc:docMkLst>
-        <pc:docMk/>
-      </pc:docMkLst>
-      <pc:sldChg chg="modSp">
-        <pc:chgData name="Stefan Horak" userId="e2bae3e58e102d1b" providerId="Windows Live" clId="Web-{9CFEFA10-5DCA-4815-A16B-90188ED57584}" dt="2024-01-16T10:49:36.872" v="55" actId="20577"/>
-        <pc:sldMkLst>
-          <pc:docMk/>
-          <pc:sldMk cId="3769825779" sldId="262"/>
-        </pc:sldMkLst>
-        <pc:spChg chg="mod">
-          <ac:chgData name="Stefan Horak" userId="e2bae3e58e102d1b" providerId="Windows Live" clId="Web-{9CFEFA10-5DCA-4815-A16B-90188ED57584}" dt="2024-01-16T10:49:36.872" v="55" actId="20577"/>
-          <ac:spMkLst>
-            <pc:docMk/>
-            <pc:sldMk cId="3769825779" sldId="262"/>
-            <ac:spMk id="2" creationId="{A1FC906E-4D88-D885-CE12-463ED76A5457}"/>
-          </ac:spMkLst>
-        </pc:spChg>
-      </pc:sldChg>
-    </pc:docChg>
-  </pc:docChgLst>
 </pc:chgInfo>
 </file>
 
@@ -1377,7 +1375,7 @@
           </a:lstStyle>
           <a:p>
             <a:fld id="{80DC2C78-318C-4993-ADA1-01A34D3D57C6}" type="datetimeFigureOut">
-              <a:t>1/16/2024</a:t>
+              <a:t>19/04/2024</a:t>
             </a:fld>
             <a:endParaRPr lang="de-DE"/>
           </a:p>
@@ -1534,7 +1532,7 @@
           </a:lstStyle>
           <a:p>
             <a:fld id="{8D2ECC9A-C9F6-4569-BF7F-3F01CD0EB5B1}" type="slidenum">
-              <a:t>‹#›</a:t>
+              <a:t>‹Nr.›</a:t>
             </a:fld>
             <a:endParaRPr lang="de-DE"/>
           </a:p>
@@ -2401,175 +2399,6 @@
 </p:notes>
 </file>
 
-<file path=ppt/notesSlides/notesSlide7.xml><?xml version="1.0" encoding="utf-8"?>
-<p:notes xmlns:a="http://schemas.openxmlformats.org/drawingml/2006/main" xmlns:r="http://schemas.openxmlformats.org/officeDocument/2006/relationships" xmlns:p="http://schemas.openxmlformats.org/presentationml/2006/main">
-  <p:cSld>
-    <p:spTree>
-      <p:nvGrpSpPr>
-        <p:cNvPr id="1" name="">
-          <a:extLst>
-            <a:ext uri="{FF2B5EF4-FFF2-40B4-BE49-F238E27FC236}">
-              <a16:creationId xmlns:a16="http://schemas.microsoft.com/office/drawing/2014/main" id="{2BB84A7F-F95E-4D42-75DF-F8EBC63A2C1B}"/>
-            </a:ext>
-          </a:extLst>
-        </p:cNvPr>
-        <p:cNvGrpSpPr/>
-        <p:nvPr/>
-      </p:nvGrpSpPr>
-      <p:grpSpPr>
-        <a:xfrm>
-          <a:off x="0" y="0"/>
-          <a:ext cx="0" cy="0"/>
-          <a:chOff x="0" y="0"/>
-          <a:chExt cx="0" cy="0"/>
-        </a:xfrm>
-      </p:grpSpPr>
-      <p:sp>
-        <p:nvSpPr>
-          <p:cNvPr id="2" name="Folienbildplatzhalter 1">
-            <a:extLst>
-              <a:ext uri="{FF2B5EF4-FFF2-40B4-BE49-F238E27FC236}">
-                <a16:creationId xmlns:a16="http://schemas.microsoft.com/office/drawing/2014/main" id="{AA34B868-5040-298E-63E7-5399BF5AC111}"/>
-              </a:ext>
-            </a:extLst>
-          </p:cNvPr>
-          <p:cNvSpPr>
-            <a:spLocks noGrp="1" noRot="1" noChangeAspect="1"/>
-          </p:cNvSpPr>
-          <p:nvPr>
-            <p:ph type="sldImg"/>
-          </p:nvPr>
-        </p:nvSpPr>
-        <p:spPr/>
-      </p:sp>
-      <p:sp>
-        <p:nvSpPr>
-          <p:cNvPr id="3" name="Notizenplatzhalter 2">
-            <a:extLst>
-              <a:ext uri="{FF2B5EF4-FFF2-40B4-BE49-F238E27FC236}">
-                <a16:creationId xmlns:a16="http://schemas.microsoft.com/office/drawing/2014/main" id="{2E32E2E1-0CB7-0CFC-A603-D24F69F61112}"/>
-              </a:ext>
-            </a:extLst>
-          </p:cNvPr>
-          <p:cNvSpPr>
-            <a:spLocks noGrp="1"/>
-          </p:cNvSpPr>
-          <p:nvPr>
-            <p:ph type="body" idx="1"/>
-          </p:nvPr>
-        </p:nvSpPr>
-        <p:spPr/>
-        <p:txBody>
-          <a:bodyPr/>
-          <a:lstStyle/>
-          <a:p>
-            <a:r>
-              <a:rPr lang="en-US">
-                <a:ea typeface="Calibri"/>
-                <a:cs typeface="Calibri"/>
-              </a:rPr>
-              <a:t>Nach </a:t>
-            </a:r>
-            <a:r>
-              <a:rPr lang="en-US" err="1">
-                <a:ea typeface="Calibri"/>
-                <a:cs typeface="Calibri"/>
-              </a:rPr>
-              <a:t>dieser</a:t>
-            </a:r>
-            <a:r>
-              <a:rPr lang="en-US">
-                <a:ea typeface="Calibri"/>
-                <a:cs typeface="Calibri"/>
-              </a:rPr>
-              <a:t> Folie </a:t>
-            </a:r>
-            <a:r>
-              <a:rPr lang="en-US" err="1">
-                <a:ea typeface="Calibri"/>
-                <a:cs typeface="Calibri"/>
-              </a:rPr>
-              <a:t>erfolgt</a:t>
-            </a:r>
-            <a:r>
-              <a:rPr lang="en-US">
-                <a:ea typeface="Calibri"/>
-                <a:cs typeface="Calibri"/>
-              </a:rPr>
-              <a:t> </a:t>
-            </a:r>
-            <a:r>
-              <a:rPr lang="en-US" err="1">
-                <a:ea typeface="Calibri"/>
-                <a:cs typeface="Calibri"/>
-              </a:rPr>
-              <a:t>eine</a:t>
-            </a:r>
-            <a:r>
-              <a:rPr lang="en-US">
-                <a:ea typeface="Calibri"/>
-                <a:cs typeface="Calibri"/>
-              </a:rPr>
-              <a:t> </a:t>
-            </a:r>
-            <a:r>
-              <a:rPr lang="en-US" err="1">
-                <a:ea typeface="Calibri"/>
-                <a:cs typeface="Calibri"/>
-              </a:rPr>
-              <a:t>kurze</a:t>
-            </a:r>
-            <a:r>
-              <a:rPr lang="en-US">
-                <a:ea typeface="Calibri"/>
-                <a:cs typeface="Calibri"/>
-              </a:rPr>
-              <a:t> Live-Demonstration der Software.</a:t>
-            </a:r>
-          </a:p>
-        </p:txBody>
-      </p:sp>
-      <p:sp>
-        <p:nvSpPr>
-          <p:cNvPr id="4" name="Foliennummernplatzhalter 3">
-            <a:extLst>
-              <a:ext uri="{FF2B5EF4-FFF2-40B4-BE49-F238E27FC236}">
-                <a16:creationId xmlns:a16="http://schemas.microsoft.com/office/drawing/2014/main" id="{49B23E4E-9CD9-032C-24B4-C2064EFA31E0}"/>
-              </a:ext>
-            </a:extLst>
-          </p:cNvPr>
-          <p:cNvSpPr>
-            <a:spLocks noGrp="1"/>
-          </p:cNvSpPr>
-          <p:nvPr>
-            <p:ph type="sldNum" sz="quarter" idx="5"/>
-          </p:nvPr>
-        </p:nvSpPr>
-        <p:spPr/>
-        <p:txBody>
-          <a:bodyPr/>
-          <a:lstStyle/>
-          <a:p>
-            <a:fld id="{8D2ECC9A-C9F6-4569-BF7F-3F01CD0EB5B1}" type="slidenum">
-              <a:t>14</a:t>
-            </a:fld>
-            <a:endParaRPr lang="de-DE"/>
-          </a:p>
-        </p:txBody>
-      </p:sp>
-    </p:spTree>
-    <p:extLst>
-      <p:ext uri="{BB962C8B-B14F-4D97-AF65-F5344CB8AC3E}">
-        <p14:creationId xmlns:p14="http://schemas.microsoft.com/office/powerpoint/2010/main" val="4221259383"/>
-      </p:ext>
-    </p:extLst>
-  </p:cSld>
-  <p:clrMapOvr>
-    <a:masterClrMapping/>
-  </p:clrMapOvr>
-</p:notes>
-</file>
-
 <file path=ppt/slideLayouts/slideLayout1.xml><?xml version="1.0" encoding="utf-8"?>
 <p:sldLayout xmlns:a="http://schemas.openxmlformats.org/drawingml/2006/main" xmlns:r="http://schemas.openxmlformats.org/officeDocument/2006/relationships" xmlns:p="http://schemas.openxmlformats.org/presentationml/2006/main" type="title" preserve="1">
   <p:cSld name="Titelfolie">
@@ -2699,7 +2528,7 @@
           <a:p>
             <a:fld id="{D3EB3054-B75A-4BD7-8B3E-8DC0F614FAF3}" type="datetimeFigureOut">
               <a:rPr lang="de-DE" smtClean="0"/>
-              <a:t>16.01.2024</a:t>
+              <a:t>19.04.2024</a:t>
             </a:fld>
             <a:endParaRPr lang="de-DE"/>
           </a:p>
@@ -2741,7 +2570,7 @@
           <a:p>
             <a:fld id="{802006FE-6571-4354-8775-F8708372C227}" type="slidenum">
               <a:rPr lang="de-DE" smtClean="0"/>
-              <a:t>‹#›</a:t>
+              <a:t>‹Nr.›</a:t>
             </a:fld>
             <a:endParaRPr lang="de-DE"/>
           </a:p>
@@ -2867,7 +2696,7 @@
           <a:p>
             <a:fld id="{D3EB3054-B75A-4BD7-8B3E-8DC0F614FAF3}" type="datetimeFigureOut">
               <a:rPr lang="de-DE" smtClean="0"/>
-              <a:t>16.01.2024</a:t>
+              <a:t>19.04.2024</a:t>
             </a:fld>
             <a:endParaRPr lang="de-DE"/>
           </a:p>
@@ -2909,7 +2738,7 @@
           <a:p>
             <a:fld id="{802006FE-6571-4354-8775-F8708372C227}" type="slidenum">
               <a:rPr lang="de-DE" smtClean="0"/>
-              <a:t>‹#›</a:t>
+              <a:t>‹Nr.›</a:t>
             </a:fld>
             <a:endParaRPr lang="de-DE"/>
           </a:p>
@@ -3045,7 +2874,7 @@
           <a:p>
             <a:fld id="{D3EB3054-B75A-4BD7-8B3E-8DC0F614FAF3}" type="datetimeFigureOut">
               <a:rPr lang="de-DE" smtClean="0"/>
-              <a:t>16.01.2024</a:t>
+              <a:t>19.04.2024</a:t>
             </a:fld>
             <a:endParaRPr lang="de-DE"/>
           </a:p>
@@ -3087,7 +2916,7 @@
           <a:p>
             <a:fld id="{802006FE-6571-4354-8775-F8708372C227}" type="slidenum">
               <a:rPr lang="de-DE" smtClean="0"/>
-              <a:t>‹#›</a:t>
+              <a:t>‹Nr.›</a:t>
             </a:fld>
             <a:endParaRPr lang="de-DE"/>
           </a:p>
@@ -3213,7 +3042,7 @@
           <a:p>
             <a:fld id="{D3EB3054-B75A-4BD7-8B3E-8DC0F614FAF3}" type="datetimeFigureOut">
               <a:rPr lang="de-DE" smtClean="0"/>
-              <a:t>16.01.2024</a:t>
+              <a:t>19.04.2024</a:t>
             </a:fld>
             <a:endParaRPr lang="de-DE"/>
           </a:p>
@@ -3255,7 +3084,7 @@
           <a:p>
             <a:fld id="{802006FE-6571-4354-8775-F8708372C227}" type="slidenum">
               <a:rPr lang="de-DE" smtClean="0"/>
-              <a:t>‹#›</a:t>
+              <a:t>‹Nr.›</a:t>
             </a:fld>
             <a:endParaRPr lang="de-DE"/>
           </a:p>
@@ -3458,7 +3287,7 @@
           <a:p>
             <a:fld id="{D3EB3054-B75A-4BD7-8B3E-8DC0F614FAF3}" type="datetimeFigureOut">
               <a:rPr lang="de-DE" smtClean="0"/>
-              <a:t>16.01.2024</a:t>
+              <a:t>19.04.2024</a:t>
             </a:fld>
             <a:endParaRPr lang="de-DE"/>
           </a:p>
@@ -3500,7 +3329,7 @@
           <a:p>
             <a:fld id="{802006FE-6571-4354-8775-F8708372C227}" type="slidenum">
               <a:rPr lang="de-DE" smtClean="0"/>
-              <a:t>‹#›</a:t>
+              <a:t>‹Nr.›</a:t>
             </a:fld>
             <a:endParaRPr lang="de-DE"/>
           </a:p>
@@ -3687,7 +3516,7 @@
           <a:p>
             <a:fld id="{D3EB3054-B75A-4BD7-8B3E-8DC0F614FAF3}" type="datetimeFigureOut">
               <a:rPr lang="de-DE" smtClean="0"/>
-              <a:t>16.01.2024</a:t>
+              <a:t>19.04.2024</a:t>
             </a:fld>
             <a:endParaRPr lang="de-DE"/>
           </a:p>
@@ -3729,7 +3558,7 @@
           <a:p>
             <a:fld id="{802006FE-6571-4354-8775-F8708372C227}" type="slidenum">
               <a:rPr lang="de-DE" smtClean="0"/>
-              <a:t>‹#›</a:t>
+              <a:t>‹Nr.›</a:t>
             </a:fld>
             <a:endParaRPr lang="de-DE"/>
           </a:p>
@@ -4051,7 +3880,7 @@
           <a:p>
             <a:fld id="{D3EB3054-B75A-4BD7-8B3E-8DC0F614FAF3}" type="datetimeFigureOut">
               <a:rPr lang="de-DE" smtClean="0"/>
-              <a:t>16.01.2024</a:t>
+              <a:t>19.04.2024</a:t>
             </a:fld>
             <a:endParaRPr lang="de-DE"/>
           </a:p>
@@ -4093,7 +3922,7 @@
           <a:p>
             <a:fld id="{802006FE-6571-4354-8775-F8708372C227}" type="slidenum">
               <a:rPr lang="de-DE" smtClean="0"/>
-              <a:t>‹#›</a:t>
+              <a:t>‹Nr.›</a:t>
             </a:fld>
             <a:endParaRPr lang="de-DE"/>
           </a:p>
@@ -4168,7 +3997,7 @@
           <a:p>
             <a:fld id="{D3EB3054-B75A-4BD7-8B3E-8DC0F614FAF3}" type="datetimeFigureOut">
               <a:rPr lang="de-DE" smtClean="0"/>
-              <a:t>16.01.2024</a:t>
+              <a:t>19.04.2024</a:t>
             </a:fld>
             <a:endParaRPr lang="de-DE"/>
           </a:p>
@@ -4210,7 +4039,7 @@
           <a:p>
             <a:fld id="{802006FE-6571-4354-8775-F8708372C227}" type="slidenum">
               <a:rPr lang="de-DE" smtClean="0"/>
-              <a:t>‹#›</a:t>
+              <a:t>‹Nr.›</a:t>
             </a:fld>
             <a:endParaRPr lang="de-DE"/>
           </a:p>
@@ -4263,7 +4092,7 @@
           <a:p>
             <a:fld id="{D3EB3054-B75A-4BD7-8B3E-8DC0F614FAF3}" type="datetimeFigureOut">
               <a:rPr lang="de-DE" smtClean="0"/>
-              <a:t>16.01.2024</a:t>
+              <a:t>19.04.2024</a:t>
             </a:fld>
             <a:endParaRPr lang="de-DE"/>
           </a:p>
@@ -4305,7 +4134,7 @@
           <a:p>
             <a:fld id="{802006FE-6571-4354-8775-F8708372C227}" type="slidenum">
               <a:rPr lang="de-DE" smtClean="0"/>
-              <a:t>‹#›</a:t>
+              <a:t>‹Nr.›</a:t>
             </a:fld>
             <a:endParaRPr lang="de-DE"/>
           </a:p>
@@ -4538,7 +4367,7 @@
           <a:p>
             <a:fld id="{D3EB3054-B75A-4BD7-8B3E-8DC0F614FAF3}" type="datetimeFigureOut">
               <a:rPr lang="de-DE" smtClean="0"/>
-              <a:t>16.01.2024</a:t>
+              <a:t>19.04.2024</a:t>
             </a:fld>
             <a:endParaRPr lang="de-DE"/>
           </a:p>
@@ -4580,7 +4409,7 @@
           <a:p>
             <a:fld id="{802006FE-6571-4354-8775-F8708372C227}" type="slidenum">
               <a:rPr lang="de-DE" smtClean="0"/>
-              <a:t>‹#›</a:t>
+              <a:t>‹Nr.›</a:t>
             </a:fld>
             <a:endParaRPr lang="de-DE"/>
           </a:p>
@@ -4790,7 +4619,7 @@
           <a:p>
             <a:fld id="{D3EB3054-B75A-4BD7-8B3E-8DC0F614FAF3}" type="datetimeFigureOut">
               <a:rPr lang="de-DE" smtClean="0"/>
-              <a:t>16.01.2024</a:t>
+              <a:t>19.04.2024</a:t>
             </a:fld>
             <a:endParaRPr lang="de-DE"/>
           </a:p>
@@ -4832,7 +4661,7 @@
           <a:p>
             <a:fld id="{802006FE-6571-4354-8775-F8708372C227}" type="slidenum">
               <a:rPr lang="de-DE" smtClean="0"/>
-              <a:t>‹#›</a:t>
+              <a:t>‹Nr.›</a:t>
             </a:fld>
             <a:endParaRPr lang="de-DE"/>
           </a:p>
@@ -5001,7 +4830,7 @@
           <a:p>
             <a:fld id="{D3EB3054-B75A-4BD7-8B3E-8DC0F614FAF3}" type="datetimeFigureOut">
               <a:rPr lang="de-DE" smtClean="0"/>
-              <a:t>16.01.2024</a:t>
+              <a:t>19.04.2024</a:t>
             </a:fld>
             <a:endParaRPr lang="de-DE"/>
           </a:p>
@@ -5079,7 +4908,7 @@
           <a:p>
             <a:fld id="{802006FE-6571-4354-8775-F8708372C227}" type="slidenum">
               <a:rPr lang="de-DE" smtClean="0"/>
-              <a:t>‹#›</a:t>
+              <a:t>‹Nr.›</a:t>
             </a:fld>
             <a:endParaRPr lang="de-DE"/>
           </a:p>
@@ -6800,7 +6629,7 @@
           <a:p>
             <a:pPr algn="ctr"/>
             <a:r>
-              <a:rPr lang="de-DE" b="1">
+              <a:rPr lang="de-DE" b="1" dirty="0">
                 <a:solidFill>
                   <a:srgbClr val="E5E5CB"/>
                 </a:solidFill>
@@ -6810,7 +6639,7 @@
               <a:t>Automation Helper </a:t>
             </a:r>
             <a:r>
-              <a:rPr lang="de-DE" b="1" err="1">
+              <a:rPr lang="de-DE" b="1" dirty="0" err="1">
                 <a:solidFill>
                   <a:srgbClr val="E5E5CB"/>
                 </a:solidFill>
@@ -6820,7 +6649,7 @@
               <a:t>for</a:t>
             </a:r>
             <a:r>
-              <a:rPr lang="de-DE" b="1">
+              <a:rPr lang="de-DE" b="1" dirty="0">
                 <a:solidFill>
                   <a:srgbClr val="E5E5CB"/>
                 </a:solidFill>
@@ -6830,7 +6659,7 @@
               <a:t> </a:t>
             </a:r>
             <a:r>
-              <a:rPr lang="de-DE" b="1" err="1">
+              <a:rPr lang="de-DE" b="1" dirty="0" err="1">
                 <a:solidFill>
                   <a:srgbClr val="E5E5CB"/>
                 </a:solidFill>
@@ -6840,7 +6669,7 @@
               <a:t>Literature</a:t>
             </a:r>
             <a:r>
-              <a:rPr lang="de-DE" b="1">
+              <a:rPr lang="de-DE" b="1" dirty="0">
                 <a:solidFill>
                   <a:srgbClr val="E5E5CB"/>
                 </a:solidFill>
@@ -6850,7 +6679,7 @@
               <a:t> Reviews</a:t>
             </a:r>
             <a:br>
-              <a:rPr lang="de-DE" b="1">
+              <a:rPr lang="de-DE" b="1" dirty="0">
                 <a:solidFill>
                   <a:srgbClr val="E5E5CB"/>
                 </a:solidFill>
@@ -6859,51 +6688,63 @@
               </a:rPr>
             </a:br>
             <a:br>
-              <a:rPr lang="de-DE" b="1">
+              <a:rPr lang="de-DE" b="1" dirty="0">
                 <a:ea typeface="Calibri Light"/>
                 <a:cs typeface="Calibri Light"/>
               </a:rPr>
             </a:br>
             <a:br>
-              <a:rPr lang="de-DE" b="1">
+              <a:rPr lang="de-DE" b="1" dirty="0">
                 <a:ea typeface="Calibri Light"/>
                 <a:cs typeface="Calibri Light"/>
               </a:rPr>
             </a:br>
-            <a:r>
-              <a:rPr lang="de-DE" b="1">
-                <a:solidFill>
-                  <a:srgbClr val="E5E5CB"/>
-                </a:solidFill>
+            <a:br>
+              <a:rPr lang="de-DE" b="1" dirty="0">
                 <a:ea typeface="Calibri Light"/>
                 <a:cs typeface="Calibri Light"/>
               </a:rPr>
-              <a:t>- </a:t>
-            </a:r>
-            <a:r>
-              <a:rPr lang="de-DE" b="1" err="1">
-                <a:solidFill>
-                  <a:srgbClr val="E5E5CB"/>
-                </a:solidFill>
+            </a:br>
+            <a:br>
+              <a:rPr lang="de-DE" b="1" dirty="0">
                 <a:ea typeface="Calibri Light"/>
                 <a:cs typeface="Calibri Light"/>
               </a:rPr>
-              <a:t>Discussion</a:t>
-            </a:r>
-            <a:r>
-              <a:rPr lang="de-DE" b="1">
+            </a:br>
+            <a:r>
+              <a:rPr lang="de-DE" b="1" dirty="0">
                 <a:solidFill>
                   <a:srgbClr val="E5E5CB"/>
                 </a:solidFill>
                 <a:ea typeface="Calibri Light"/>
                 <a:cs typeface="Calibri Light"/>
               </a:rPr>
+              <a:t>- </a:t>
+            </a:r>
+            <a:r>
+              <a:rPr lang="de-DE" b="1" dirty="0" err="1">
+                <a:solidFill>
+                  <a:srgbClr val="E5E5CB"/>
+                </a:solidFill>
+                <a:ea typeface="Calibri Light"/>
+                <a:cs typeface="Calibri Light"/>
+              </a:rPr>
+              <a:t>Discussion</a:t>
+            </a:r>
+            <a:r>
+              <a:rPr lang="de-DE" b="1" dirty="0">
+                <a:solidFill>
+                  <a:srgbClr val="E5E5CB"/>
+                </a:solidFill>
+                <a:ea typeface="Calibri Light"/>
+                <a:cs typeface="Calibri Light"/>
+              </a:rPr>
               <a:t>  -</a:t>
             </a:r>
-            <a:endParaRPr lang="de-DE"/>
-          </a:p>
-          <a:p>
-            <a:endParaRPr lang="de-DE">
+            <a:endParaRPr lang="de-DE" dirty="0"/>
+          </a:p>
+          <a:p>
+            <a:endParaRPr lang="de-DE" dirty="0">
               <a:ea typeface="Calibri Light"/>
               <a:cs typeface="Calibri Light"/>
             </a:endParaRPr>
@@ -6924,7 +6765,7 @@
 </file>
 
 <file path=ppt/slides/slide12.xml><?xml version="1.0" encoding="utf-8"?>
-<p:sld xmlns:a="http://schemas.openxmlformats.org/drawingml/2006/main" xmlns:r="http://schemas.openxmlformats.org/officeDocument/2006/relationships" xmlns:p="http://schemas.openxmlformats.org/presentationml/2006/main" show="0">
+<p:sld xmlns:a="http://schemas.openxmlformats.org/drawingml/2006/main" xmlns:r="http://schemas.openxmlformats.org/officeDocument/2006/relationships" xmlns:p="http://schemas.openxmlformats.org/presentationml/2006/main">
   <p:cSld>
     <p:bg>
       <p:bgPr>
@@ -7068,12 +6909,12 @@
         </p:spPr>
         <p:txBody>
           <a:bodyPr vert="horz" lIns="91440" tIns="45720" rIns="91440" bIns="45720" rtlCol="0" anchor="t">
-            <a:normAutofit fontScale="92500" lnSpcReduction="10000"/>
+            <a:normAutofit fontScale="92500" lnSpcReduction="20000"/>
           </a:bodyPr>
           <a:lstStyle/>
           <a:p>
             <a:r>
-              <a:rPr lang="de-DE">
+              <a:rPr lang="de-DE" dirty="0">
                 <a:solidFill>
                   <a:srgbClr val="E5E5CB"/>
                 </a:solidFill>
@@ -7083,7 +6924,7 @@
               <a:t>The Automation Helper </a:t>
             </a:r>
             <a:r>
-              <a:rPr lang="de-DE" err="1">
+              <a:rPr lang="de-DE" dirty="0" err="1">
                 <a:solidFill>
                   <a:srgbClr val="E5E5CB"/>
                 </a:solidFill>
@@ -7093,7 +6934,7 @@
               <a:t>takes</a:t>
             </a:r>
             <a:r>
-              <a:rPr lang="de-DE">
+              <a:rPr lang="de-DE" dirty="0">
                 <a:solidFill>
                   <a:srgbClr val="E5E5CB"/>
                 </a:solidFill>
@@ -7103,7 +6944,7 @@
               <a:t> a </a:t>
             </a:r>
             <a:r>
-              <a:rPr lang="de-DE" err="1">
+              <a:rPr lang="de-DE" dirty="0" err="1">
                 <a:solidFill>
                   <a:srgbClr val="E5E5CB"/>
                 </a:solidFill>
@@ -7113,7 +6954,7 @@
               <a:t>set</a:t>
             </a:r>
             <a:r>
-              <a:rPr lang="de-DE">
+              <a:rPr lang="de-DE" dirty="0">
                 <a:solidFill>
                   <a:srgbClr val="E5E5CB"/>
                 </a:solidFill>
@@ -7123,7 +6964,7 @@
               <a:t> </a:t>
             </a:r>
             <a:r>
-              <a:rPr lang="de-DE" err="1">
+              <a:rPr lang="de-DE" dirty="0" err="1">
                 <a:solidFill>
                   <a:srgbClr val="E5E5CB"/>
                 </a:solidFill>
@@ -7133,7 +6974,7 @@
               <a:t>of</a:t>
             </a:r>
             <a:r>
-              <a:rPr lang="de-DE">
+              <a:rPr lang="de-DE" dirty="0">
                 <a:solidFill>
                   <a:srgbClr val="E5E5CB"/>
                 </a:solidFill>
@@ -7143,7 +6984,7 @@
               <a:t> PDF </a:t>
             </a:r>
             <a:r>
-              <a:rPr lang="de-DE" err="1">
+              <a:rPr lang="de-DE" dirty="0" err="1">
                 <a:solidFill>
                   <a:srgbClr val="E5E5CB"/>
                 </a:solidFill>
@@ -7153,7 +6994,7 @@
               <a:t>files</a:t>
             </a:r>
             <a:r>
-              <a:rPr lang="de-DE">
+              <a:rPr lang="de-DE" dirty="0">
                 <a:solidFill>
                   <a:srgbClr val="E5E5CB"/>
                 </a:solidFill>
@@ -7163,7 +7004,7 @@
               <a:t> </a:t>
             </a:r>
             <a:r>
-              <a:rPr lang="de-DE" err="1">
+              <a:rPr lang="de-DE" dirty="0" err="1">
                 <a:solidFill>
                   <a:srgbClr val="E5E5CB"/>
                 </a:solidFill>
@@ -7173,7 +7014,7 @@
               <a:t>as</a:t>
             </a:r>
             <a:r>
-              <a:rPr lang="de-DE">
+              <a:rPr lang="de-DE" dirty="0">
                 <a:solidFill>
                   <a:srgbClr val="E5E5CB"/>
                 </a:solidFill>
@@ -7183,7 +7024,7 @@
               <a:t> </a:t>
             </a:r>
             <a:r>
-              <a:rPr lang="de-DE" err="1">
+              <a:rPr lang="de-DE" dirty="0" err="1">
                 <a:solidFill>
                   <a:srgbClr val="E5E5CB"/>
                 </a:solidFill>
@@ -7193,7 +7034,7 @@
               <a:t>input</a:t>
             </a:r>
             <a:r>
-              <a:rPr lang="de-DE">
+              <a:rPr lang="de-DE" dirty="0">
                 <a:solidFill>
                   <a:srgbClr val="E5E5CB"/>
                 </a:solidFill>
@@ -7209,17 +7050,7 @@
               <a:buChar char="Ø"/>
             </a:pPr>
             <a:r>
-              <a:rPr lang="de-DE" err="1">
-                <a:solidFill>
-                  <a:srgbClr val="E5E5CB"/>
-                </a:solidFill>
-                <a:ea typeface="Calibri"/>
-                <a:cs typeface="Calibri"/>
-              </a:rPr>
-              <a:t>Either</a:t>
-            </a:r>
-            <a:r>
-              <a:rPr lang="de-DE">
+              <a:rPr lang="de-DE" dirty="0">
                 <a:solidFill>
                   <a:srgbClr val="E5E5CB"/>
                 </a:solidFill>
@@ -7229,7 +7060,7 @@
               <a:t> </a:t>
             </a:r>
             <a:r>
-              <a:rPr lang="de-DE" err="1">
+              <a:rPr lang="de-DE" dirty="0" err="1">
                 <a:solidFill>
                   <a:srgbClr val="E5E5CB"/>
                 </a:solidFill>
@@ -7239,7 +7070,7 @@
               <a:t>from</a:t>
             </a:r>
             <a:r>
-              <a:rPr lang="de-DE">
+              <a:rPr lang="de-DE" dirty="0">
                 <a:solidFill>
                   <a:srgbClr val="E5E5CB"/>
                 </a:solidFill>
@@ -7249,7 +7080,7 @@
               <a:t> an 'Open File </a:t>
             </a:r>
             <a:r>
-              <a:rPr lang="de-DE" err="1">
+              <a:rPr lang="de-DE" dirty="0" err="1">
                 <a:solidFill>
                   <a:srgbClr val="E5E5CB"/>
                 </a:solidFill>
@@ -7259,14 +7090,14 @@
               <a:t>Dialogue</a:t>
             </a:r>
             <a:r>
-              <a:rPr lang="de-DE">
-                <a:solidFill>
-                  <a:srgbClr val="E5E5CB"/>
-                </a:solidFill>
-                <a:ea typeface="Calibri"/>
-                <a:cs typeface="Calibri"/>
-              </a:rPr>
-              <a:t>'</a:t>
+              <a:rPr lang="de-DE" dirty="0">
+                <a:solidFill>
+                  <a:srgbClr val="E5E5CB"/>
+                </a:solidFill>
+                <a:ea typeface="Calibri"/>
+                <a:cs typeface="Calibri"/>
+              </a:rPr>
+              <a:t>‘</a:t>
             </a:r>
           </a:p>
           <a:p>
@@ -7275,7 +7106,17 @@
               <a:buChar char="Ø"/>
             </a:pPr>
             <a:r>
-              <a:rPr lang="de-DE" err="1">
+              <a:rPr lang="de-DE" dirty="0">
+                <a:solidFill>
+                  <a:srgbClr val="E5E5CB"/>
+                </a:solidFill>
+                <a:ea typeface="Calibri"/>
+                <a:cs typeface="Calibri"/>
+              </a:rPr>
+              <a:t> </a:t>
+            </a:r>
+            <a:r>
+              <a:rPr lang="de-DE" dirty="0" err="1">
                 <a:solidFill>
                   <a:srgbClr val="E5E5CB"/>
                 </a:solidFill>
@@ -7285,7 +7126,7 @@
               <a:t>or</a:t>
             </a:r>
             <a:r>
-              <a:rPr lang="de-DE">
+              <a:rPr lang="de-DE" dirty="0">
                 <a:solidFill>
                   <a:srgbClr val="E5E5CB"/>
                 </a:solidFill>
@@ -7295,17 +7136,57 @@
               <a:t> </a:t>
             </a:r>
             <a:r>
-              <a:rPr lang="de-DE" err="1">
-                <a:solidFill>
-                  <a:srgbClr val="E5E5CB"/>
-                </a:solidFill>
-                <a:ea typeface="Calibri"/>
-                <a:cs typeface="Calibri"/>
-              </a:rPr>
-              <a:t>directly</a:t>
-            </a:r>
-            <a:r>
-              <a:rPr lang="de-DE">
+              <a:rPr lang="de-DE" dirty="0" err="1">
+                <a:solidFill>
+                  <a:srgbClr val="E5E5CB"/>
+                </a:solidFill>
+                <a:ea typeface="Calibri"/>
+                <a:cs typeface="Calibri"/>
+              </a:rPr>
+              <a:t>from</a:t>
+            </a:r>
+            <a:r>
+              <a:rPr lang="de-DE" dirty="0">
+                <a:solidFill>
+                  <a:srgbClr val="E5E5CB"/>
+                </a:solidFill>
+                <a:ea typeface="Calibri"/>
+                <a:cs typeface="Calibri"/>
+              </a:rPr>
+              <a:t> a </a:t>
+            </a:r>
+            <a:r>
+              <a:rPr lang="de-DE" dirty="0" err="1">
+                <a:solidFill>
+                  <a:srgbClr val="E5E5CB"/>
+                </a:solidFill>
+                <a:ea typeface="Calibri"/>
+                <a:cs typeface="Calibri"/>
+              </a:rPr>
+              <a:t>connected</a:t>
+            </a:r>
+            <a:r>
+              <a:rPr lang="de-DE" dirty="0">
+                <a:solidFill>
+                  <a:srgbClr val="E5E5CB"/>
+                </a:solidFill>
+                <a:ea typeface="Calibri"/>
+                <a:cs typeface="Calibri"/>
+              </a:rPr>
+              <a:t> </a:t>
+            </a:r>
+            <a:r>
+              <a:rPr lang="de-DE" dirty="0" err="1">
+                <a:solidFill>
+                  <a:srgbClr val="E5E5CB"/>
+                </a:solidFill>
+                <a:ea typeface="Calibri"/>
+                <a:cs typeface="Calibri"/>
+              </a:rPr>
+              <a:t>Zotero</a:t>
+            </a:r>
+            <a:r>
+              <a:rPr lang="de-DE" dirty="0">
                 <a:solidFill>
                   <a:srgbClr val="E5E5CB"/>
                 </a:solidFill>
@@ -7315,67 +7196,7 @@
               <a:t> </a:t>
             </a:r>
             <a:r>
-              <a:rPr lang="de-DE" err="1">
-                <a:solidFill>
-                  <a:srgbClr val="E5E5CB"/>
-                </a:solidFill>
-                <a:ea typeface="Calibri"/>
-                <a:cs typeface="Calibri"/>
-              </a:rPr>
-              <a:t>from</a:t>
-            </a:r>
-            <a:r>
-              <a:rPr lang="de-DE">
-                <a:solidFill>
-                  <a:srgbClr val="E5E5CB"/>
-                </a:solidFill>
-                <a:ea typeface="Calibri"/>
-                <a:cs typeface="Calibri"/>
-              </a:rPr>
-              <a:t> a </a:t>
-            </a:r>
-            <a:r>
-              <a:rPr lang="de-DE" err="1">
-                <a:solidFill>
-                  <a:srgbClr val="E5E5CB"/>
-                </a:solidFill>
-                <a:ea typeface="Calibri"/>
-                <a:cs typeface="Calibri"/>
-              </a:rPr>
-              <a:t>connected</a:t>
-            </a:r>
-            <a:r>
-              <a:rPr lang="de-DE">
-                <a:solidFill>
-                  <a:srgbClr val="E5E5CB"/>
-                </a:solidFill>
-                <a:ea typeface="Calibri"/>
-                <a:cs typeface="Calibri"/>
-              </a:rPr>
-              <a:t> </a:t>
-            </a:r>
-            <a:r>
-              <a:rPr lang="de-DE" err="1">
-                <a:solidFill>
-                  <a:srgbClr val="E5E5CB"/>
-                </a:solidFill>
-                <a:ea typeface="Calibri"/>
-                <a:cs typeface="Calibri"/>
-              </a:rPr>
-              <a:t>Zotero</a:t>
-            </a:r>
-            <a:r>
-              <a:rPr lang="de-DE">
-                <a:solidFill>
-                  <a:srgbClr val="E5E5CB"/>
-                </a:solidFill>
-                <a:ea typeface="Calibri"/>
-                <a:cs typeface="Calibri"/>
-              </a:rPr>
-              <a:t> </a:t>
-            </a:r>
-            <a:r>
-              <a:rPr lang="de-DE" err="1">
+              <a:rPr lang="de-DE" dirty="0" err="1">
                 <a:solidFill>
                   <a:srgbClr val="E5E5CB"/>
                 </a:solidFill>
@@ -7384,7 +7205,7 @@
               </a:rPr>
               <a:t>library</a:t>
             </a:r>
-            <a:endParaRPr lang="de-DE">
+            <a:endParaRPr lang="de-DE" dirty="0">
               <a:solidFill>
                 <a:srgbClr val="E5E5CB"/>
               </a:solidFill>
@@ -7393,7 +7214,7 @@
             </a:endParaRPr>
           </a:p>
           <a:p>
-            <a:endParaRPr lang="de-DE">
+            <a:endParaRPr lang="de-DE" dirty="0">
               <a:solidFill>
                 <a:srgbClr val="E5E5CB"/>
               </a:solidFill>
@@ -7403,7 +7224,7 @@
           </a:p>
           <a:p>
             <a:r>
-              <a:rPr lang="de-DE" err="1">
+              <a:rPr lang="de-DE" dirty="0" err="1">
                 <a:solidFill>
                   <a:srgbClr val="E5E5CB"/>
                 </a:solidFill>
@@ -7413,7 +7234,7 @@
               <a:t>It</a:t>
             </a:r>
             <a:r>
-              <a:rPr lang="de-DE">
+              <a:rPr lang="de-DE" dirty="0">
                 <a:solidFill>
                   <a:srgbClr val="E5E5CB"/>
                 </a:solidFill>
@@ -7423,7 +7244,7 @@
               <a:t> </a:t>
             </a:r>
             <a:r>
-              <a:rPr lang="de-DE" err="1">
+              <a:rPr lang="de-DE" dirty="0" err="1">
                 <a:solidFill>
                   <a:srgbClr val="E5E5CB"/>
                 </a:solidFill>
@@ -7433,7 +7254,7 @@
               <a:t>generates</a:t>
             </a:r>
             <a:r>
-              <a:rPr lang="de-DE">
+              <a:rPr lang="de-DE" dirty="0">
                 <a:solidFill>
                   <a:srgbClr val="E5E5CB"/>
                 </a:solidFill>
@@ -7443,7 +7264,7 @@
               <a:t> a </a:t>
             </a:r>
             <a:r>
-              <a:rPr lang="de-DE" err="1">
+              <a:rPr lang="de-DE" dirty="0" err="1">
                 <a:solidFill>
                   <a:srgbClr val="E5E5CB"/>
                 </a:solidFill>
@@ -7453,7 +7274,7 @@
               <a:t>single</a:t>
             </a:r>
             <a:r>
-              <a:rPr lang="de-DE">
+              <a:rPr lang="de-DE" dirty="0">
                 <a:solidFill>
                   <a:srgbClr val="E5E5CB"/>
                 </a:solidFill>
@@ -7463,7 +7284,7 @@
               <a:t> </a:t>
             </a:r>
             <a:r>
-              <a:rPr lang="de-DE" err="1">
+              <a:rPr lang="de-DE" dirty="0" err="1">
                 <a:solidFill>
                   <a:srgbClr val="E5E5CB"/>
                 </a:solidFill>
@@ -7473,7 +7294,7 @@
               <a:t>output</a:t>
             </a:r>
             <a:r>
-              <a:rPr lang="de-DE">
+              <a:rPr lang="de-DE" dirty="0">
                 <a:solidFill>
                   <a:srgbClr val="E5E5CB"/>
                 </a:solidFill>
@@ -7483,7 +7304,7 @@
               <a:t> </a:t>
             </a:r>
             <a:r>
-              <a:rPr lang="de-DE" err="1">
+              <a:rPr lang="de-DE" dirty="0" err="1">
                 <a:solidFill>
                   <a:srgbClr val="E5E5CB"/>
                 </a:solidFill>
@@ -7493,7 +7314,7 @@
               <a:t>file</a:t>
             </a:r>
             <a:r>
-              <a:rPr lang="de-DE">
+              <a:rPr lang="de-DE" dirty="0">
                 <a:solidFill>
                   <a:srgbClr val="E5E5CB"/>
                 </a:solidFill>
@@ -7503,7 +7324,7 @@
               <a:t> (.</a:t>
             </a:r>
             <a:r>
-              <a:rPr lang="de-DE" err="1">
+              <a:rPr lang="de-DE" dirty="0" err="1">
                 <a:solidFill>
                   <a:srgbClr val="E5E5CB"/>
                 </a:solidFill>
@@ -7513,7 +7334,7 @@
               <a:t>docx</a:t>
             </a:r>
             <a:r>
-              <a:rPr lang="de-DE">
+              <a:rPr lang="de-DE" dirty="0">
                 <a:solidFill>
                   <a:srgbClr val="E5E5CB"/>
                 </a:solidFill>
@@ -7523,7 +7344,7 @@
               <a:t> </a:t>
             </a:r>
             <a:r>
-              <a:rPr lang="de-DE" err="1">
+              <a:rPr lang="de-DE" dirty="0" err="1">
                 <a:solidFill>
                   <a:srgbClr val="E5E5CB"/>
                 </a:solidFill>
@@ -7533,7 +7354,7 @@
               <a:t>format</a:t>
             </a:r>
             <a:r>
-              <a:rPr lang="de-DE">
+              <a:rPr lang="de-DE" dirty="0">
                 <a:solidFill>
                   <a:srgbClr val="E5E5CB"/>
                 </a:solidFill>
@@ -7543,7 +7364,7 @@
               <a:t>) </a:t>
             </a:r>
             <a:r>
-              <a:rPr lang="de-DE" err="1">
+              <a:rPr lang="de-DE" dirty="0" err="1">
                 <a:solidFill>
                   <a:srgbClr val="E5E5CB"/>
                 </a:solidFill>
@@ -7553,7 +7374,7 @@
               <a:t>that</a:t>
             </a:r>
             <a:r>
-              <a:rPr lang="de-DE">
+              <a:rPr lang="de-DE" dirty="0">
                 <a:solidFill>
                   <a:srgbClr val="E5E5CB"/>
                 </a:solidFill>
@@ -7563,7 +7384,7 @@
               <a:t> </a:t>
             </a:r>
             <a:r>
-              <a:rPr lang="de-DE" err="1">
+              <a:rPr lang="de-DE" dirty="0" err="1">
                 <a:solidFill>
                   <a:srgbClr val="E5E5CB"/>
                 </a:solidFill>
@@ -7573,7 +7394,7 @@
               <a:t>contains</a:t>
             </a:r>
             <a:r>
-              <a:rPr lang="de-DE">
+              <a:rPr lang="de-DE" dirty="0">
                 <a:solidFill>
                   <a:srgbClr val="E5E5CB"/>
                 </a:solidFill>
@@ -7589,17 +7410,17 @@
               <a:buChar char="Ø"/>
             </a:pPr>
             <a:r>
-              <a:rPr lang="de-DE">
-                <a:solidFill>
-                  <a:srgbClr val="E5E5CB"/>
-                </a:solidFill>
-                <a:ea typeface="Calibri"/>
-                <a:cs typeface="Calibri"/>
-              </a:rPr>
-              <a:t>Title, </a:t>
-            </a:r>
-            <a:r>
-              <a:rPr lang="de-DE" err="1">
+              <a:rPr lang="de-DE" dirty="0">
+                <a:solidFill>
+                  <a:srgbClr val="E5E5CB"/>
+                </a:solidFill>
+                <a:ea typeface="Calibri"/>
+                <a:cs typeface="Calibri"/>
+              </a:rPr>
+              <a:t> title, </a:t>
+            </a:r>
+            <a:r>
+              <a:rPr lang="de-DE" dirty="0" err="1">
                 <a:solidFill>
                   <a:srgbClr val="E5E5CB"/>
                 </a:solidFill>
@@ -7609,7 +7430,7 @@
               <a:t>authors</a:t>
             </a:r>
             <a:r>
-              <a:rPr lang="de-DE">
+              <a:rPr lang="de-DE" dirty="0">
                 <a:solidFill>
                   <a:srgbClr val="E5E5CB"/>
                 </a:solidFill>
@@ -7619,7 +7440,7 @@
               <a:t>, </a:t>
             </a:r>
             <a:r>
-              <a:rPr lang="de-DE" err="1">
+              <a:rPr lang="de-DE" dirty="0" err="1">
                 <a:solidFill>
                   <a:srgbClr val="E5E5CB"/>
                 </a:solidFill>
@@ -7629,7 +7450,7 @@
               <a:t>publication</a:t>
             </a:r>
             <a:r>
-              <a:rPr lang="de-DE">
+              <a:rPr lang="de-DE" dirty="0">
                 <a:solidFill>
                   <a:srgbClr val="E5E5CB"/>
                 </a:solidFill>
@@ -7645,17 +7466,17 @@
               <a:buChar char="Ø"/>
             </a:pPr>
             <a:r>
-              <a:rPr lang="de-DE">
-                <a:solidFill>
-                  <a:srgbClr val="E5E5CB"/>
-                </a:solidFill>
-                <a:ea typeface="Calibri"/>
-                <a:cs typeface="Calibri"/>
-              </a:rPr>
-              <a:t>a </a:t>
-            </a:r>
-            <a:r>
-              <a:rPr lang="de-DE" err="1">
+              <a:rPr lang="de-DE" dirty="0">
+                <a:solidFill>
+                  <a:srgbClr val="E5E5CB"/>
+                </a:solidFill>
+                <a:ea typeface="Calibri"/>
+                <a:cs typeface="Calibri"/>
+              </a:rPr>
+              <a:t> a </a:t>
+            </a:r>
+            <a:r>
+              <a:rPr lang="de-DE" dirty="0" err="1">
                 <a:solidFill>
                   <a:srgbClr val="E5E5CB"/>
                 </a:solidFill>
@@ -7665,7 +7486,7 @@
               <a:t>set</a:t>
             </a:r>
             <a:r>
-              <a:rPr lang="de-DE">
+              <a:rPr lang="de-DE" dirty="0">
                 <a:solidFill>
                   <a:srgbClr val="E5E5CB"/>
                 </a:solidFill>
@@ -7675,7 +7496,7 @@
               <a:t> </a:t>
             </a:r>
             <a:r>
-              <a:rPr lang="de-DE" err="1">
+              <a:rPr lang="de-DE" dirty="0" err="1">
                 <a:solidFill>
                   <a:srgbClr val="E5E5CB"/>
                 </a:solidFill>
@@ -7685,7 +7506,7 @@
               <a:t>of</a:t>
             </a:r>
             <a:r>
-              <a:rPr lang="de-DE">
+              <a:rPr lang="de-DE" dirty="0">
                 <a:solidFill>
                   <a:srgbClr val="E5E5CB"/>
                 </a:solidFill>
@@ -7695,7 +7516,7 @@
               <a:t> </a:t>
             </a:r>
             <a:r>
-              <a:rPr lang="de-DE" err="1">
+              <a:rPr lang="de-DE" dirty="0" err="1">
                 <a:solidFill>
                   <a:srgbClr val="E5E5CB"/>
                 </a:solidFill>
@@ -7705,7 +7526,7 @@
               <a:t>related</a:t>
             </a:r>
             <a:r>
-              <a:rPr lang="de-DE">
+              <a:rPr lang="de-DE" dirty="0">
                 <a:solidFill>
                   <a:srgbClr val="E5E5CB"/>
                 </a:solidFill>
@@ -7715,7 +7536,7 @@
               <a:t> </a:t>
             </a:r>
             <a:r>
-              <a:rPr lang="de-DE" err="1">
+              <a:rPr lang="de-DE" dirty="0" err="1">
                 <a:solidFill>
                   <a:srgbClr val="E5E5CB"/>
                 </a:solidFill>
@@ -7725,7 +7546,7 @@
               <a:t>keywords</a:t>
             </a:r>
             <a:r>
-              <a:rPr lang="de-DE">
+              <a:rPr lang="de-DE" dirty="0">
                 <a:solidFill>
                   <a:srgbClr val="E5E5CB"/>
                 </a:solidFill>
@@ -7741,7 +7562,17 @@
               <a:buChar char="Ø"/>
             </a:pPr>
             <a:r>
-              <a:rPr lang="de-DE" err="1">
+              <a:rPr lang="de-DE" dirty="0">
+                <a:solidFill>
+                  <a:srgbClr val="E5E5CB"/>
+                </a:solidFill>
+                <a:ea typeface="Calibri"/>
+                <a:cs typeface="Calibri"/>
+              </a:rPr>
+              <a:t> </a:t>
+            </a:r>
+            <a:r>
+              <a:rPr lang="de-DE" dirty="0" err="1">
                 <a:solidFill>
                   <a:srgbClr val="E5E5CB"/>
                 </a:solidFill>
@@ -7751,7 +7582,7 @@
               <a:t>word</a:t>
             </a:r>
             <a:r>
-              <a:rPr lang="de-DE">
+              <a:rPr lang="de-DE" dirty="0">
                 <a:solidFill>
                   <a:srgbClr val="E5E5CB"/>
                 </a:solidFill>
@@ -7761,7 +7592,7 @@
               <a:t> </a:t>
             </a:r>
             <a:r>
-              <a:rPr lang="de-DE" err="1">
+              <a:rPr lang="de-DE" dirty="0" err="1">
                 <a:solidFill>
                   <a:srgbClr val="E5E5CB"/>
                 </a:solidFill>
@@ -7771,7 +7602,7 @@
               <a:t>count</a:t>
             </a:r>
             <a:r>
-              <a:rPr lang="de-DE">
+              <a:rPr lang="de-DE" dirty="0">
                 <a:solidFill>
                   <a:srgbClr val="E5E5CB"/>
                 </a:solidFill>
@@ -7781,7 +7612,7 @@
               <a:t> and </a:t>
             </a:r>
             <a:r>
-              <a:rPr lang="de-DE" err="1">
+              <a:rPr lang="de-DE" dirty="0" err="1">
                 <a:solidFill>
                   <a:srgbClr val="E5E5CB"/>
                 </a:solidFill>
@@ -7791,7 +7622,7 @@
               <a:t>estimated</a:t>
             </a:r>
             <a:r>
-              <a:rPr lang="de-DE">
+              <a:rPr lang="de-DE" dirty="0">
                 <a:solidFill>
                   <a:srgbClr val="E5E5CB"/>
                 </a:solidFill>
@@ -7801,7 +7632,7 @@
               <a:t> </a:t>
             </a:r>
             <a:r>
-              <a:rPr lang="de-DE" err="1">
+              <a:rPr lang="de-DE" dirty="0" err="1">
                 <a:solidFill>
                   <a:srgbClr val="E5E5CB"/>
                 </a:solidFill>
@@ -7811,7 +7642,7 @@
               <a:t>read</a:t>
             </a:r>
             <a:r>
-              <a:rPr lang="de-DE">
+              <a:rPr lang="de-DE" dirty="0">
                 <a:solidFill>
                   <a:srgbClr val="E5E5CB"/>
                 </a:solidFill>
@@ -7821,7 +7652,7 @@
               <a:t> </a:t>
             </a:r>
             <a:r>
-              <a:rPr lang="de-DE" err="1">
+              <a:rPr lang="de-DE" dirty="0" err="1">
                 <a:solidFill>
                   <a:srgbClr val="E5E5CB"/>
                 </a:solidFill>
@@ -7831,7 +7662,7 @@
               <a:t>length</a:t>
             </a:r>
             <a:r>
-              <a:rPr lang="de-DE">
+              <a:rPr lang="de-DE" dirty="0">
                 <a:solidFill>
                   <a:srgbClr val="E5E5CB"/>
                 </a:solidFill>
@@ -7847,7 +7678,17 @@
               <a:buChar char="Ø"/>
             </a:pPr>
             <a:r>
-              <a:rPr lang="de-DE" err="1">
+              <a:rPr lang="de-DE" dirty="0">
+                <a:solidFill>
+                  <a:srgbClr val="E5E5CB"/>
+                </a:solidFill>
+                <a:ea typeface="Calibri"/>
+                <a:cs typeface="Calibri"/>
+              </a:rPr>
+              <a:t> </a:t>
+            </a:r>
+            <a:r>
+              <a:rPr lang="de-DE" dirty="0" err="1">
                 <a:solidFill>
                   <a:srgbClr val="E5E5CB"/>
                 </a:solidFill>
@@ -7857,7 +7698,7 @@
               <a:t>short</a:t>
             </a:r>
             <a:r>
-              <a:rPr lang="de-DE">
+              <a:rPr lang="de-DE" dirty="0">
                 <a:solidFill>
                   <a:srgbClr val="E5E5CB"/>
                 </a:solidFill>
@@ -7867,7 +7708,7 @@
               <a:t> and </a:t>
             </a:r>
             <a:r>
-              <a:rPr lang="de-DE" err="1">
+              <a:rPr lang="de-DE" dirty="0" err="1">
                 <a:solidFill>
                   <a:srgbClr val="E5E5CB"/>
                 </a:solidFill>
@@ -7877,7 +7718,7 @@
               <a:t>long</a:t>
             </a:r>
             <a:r>
-              <a:rPr lang="de-DE">
+              <a:rPr lang="de-DE" dirty="0">
                 <a:solidFill>
                   <a:srgbClr val="E5E5CB"/>
                 </a:solidFill>
@@ -7887,7 +7728,7 @@
               <a:t> </a:t>
             </a:r>
             <a:r>
-              <a:rPr lang="de-DE" err="1">
+              <a:rPr lang="de-DE" dirty="0" err="1">
                 <a:solidFill>
                   <a:srgbClr val="E5E5CB"/>
                 </a:solidFill>
@@ -7897,7 +7738,7 @@
               <a:t>summaries</a:t>
             </a:r>
             <a:r>
-              <a:rPr lang="de-DE">
+              <a:rPr lang="de-DE" dirty="0">
                 <a:solidFill>
                   <a:srgbClr val="E5E5CB"/>
                 </a:solidFill>
@@ -7913,17 +7754,153 @@
               <a:buChar char="Ø"/>
             </a:pPr>
             <a:r>
-              <a:rPr lang="de-DE">
-                <a:solidFill>
-                  <a:srgbClr val="E5E5CB"/>
-                </a:solidFill>
-                <a:ea typeface="Calibri"/>
-                <a:cs typeface="Calibri"/>
-              </a:rPr>
-              <a:t>all </a:t>
-            </a:r>
-            <a:r>
-              <a:rPr lang="de-DE" err="1">
+              <a:rPr lang="de-DE" dirty="0">
+                <a:solidFill>
+                  <a:srgbClr val="E5E5CB"/>
+                </a:solidFill>
+                <a:ea typeface="Calibri"/>
+                <a:cs typeface="Calibri"/>
+              </a:rPr>
+              <a:t> all </a:t>
+            </a:r>
+            <a:r>
+              <a:rPr lang="de-DE" dirty="0" err="1">
+                <a:solidFill>
+                  <a:srgbClr val="E5E5CB"/>
+                </a:solidFill>
+                <a:ea typeface="Calibri"/>
+                <a:cs typeface="Calibri"/>
+              </a:rPr>
+              <a:t>responses</a:t>
+            </a:r>
+            <a:r>
+              <a:rPr lang="de-DE" dirty="0">
+                <a:solidFill>
+                  <a:srgbClr val="E5E5CB"/>
+                </a:solidFill>
+                <a:ea typeface="Calibri"/>
+                <a:cs typeface="Calibri"/>
+              </a:rPr>
+              <a:t> </a:t>
+            </a:r>
+            <a:r>
+              <a:rPr lang="de-DE" dirty="0" err="1">
+                <a:solidFill>
+                  <a:srgbClr val="E5E5CB"/>
+                </a:solidFill>
+                <a:ea typeface="Calibri"/>
+                <a:cs typeface="Calibri"/>
+              </a:rPr>
+              <a:t>to</a:t>
+            </a:r>
+            <a:r>
+              <a:rPr lang="de-DE" dirty="0">
+                <a:solidFill>
+                  <a:srgbClr val="E5E5CB"/>
+                </a:solidFill>
+                <a:ea typeface="Calibri"/>
+                <a:cs typeface="Calibri"/>
+              </a:rPr>
+              <a:t> </a:t>
+            </a:r>
+            <a:r>
+              <a:rPr lang="de-DE" dirty="0" err="1">
+                <a:solidFill>
+                  <a:srgbClr val="E5E5CB"/>
+                </a:solidFill>
+                <a:ea typeface="Calibri"/>
+                <a:cs typeface="Calibri"/>
+              </a:rPr>
+              <a:t>the</a:t>
+            </a:r>
+            <a:r>
+              <a:rPr lang="de-DE" dirty="0">
+                <a:solidFill>
+                  <a:srgbClr val="E5E5CB"/>
+                </a:solidFill>
+                <a:ea typeface="Calibri"/>
+                <a:cs typeface="Calibri"/>
+              </a:rPr>
+              <a:t> </a:t>
+            </a:r>
+            <a:r>
+              <a:rPr lang="de-DE" dirty="0" err="1">
+                <a:solidFill>
+                  <a:srgbClr val="E5E5CB"/>
+                </a:solidFill>
+                <a:ea typeface="Calibri"/>
+                <a:cs typeface="Calibri"/>
+              </a:rPr>
+              <a:t>prompts</a:t>
+            </a:r>
+            <a:r>
+              <a:rPr lang="de-DE" dirty="0">
+                <a:solidFill>
+                  <a:srgbClr val="E5E5CB"/>
+                </a:solidFill>
+                <a:ea typeface="Calibri"/>
+                <a:cs typeface="Calibri"/>
+              </a:rPr>
+              <a:t> </a:t>
+            </a:r>
+            <a:r>
+              <a:rPr lang="de-DE" dirty="0" err="1">
+                <a:solidFill>
+                  <a:srgbClr val="E5E5CB"/>
+                </a:solidFill>
+                <a:ea typeface="Calibri"/>
+                <a:cs typeface="Calibri"/>
+              </a:rPr>
+              <a:t>asked</a:t>
+            </a:r>
+            <a:r>
+              <a:rPr lang="de-DE" dirty="0">
+                <a:solidFill>
+                  <a:srgbClr val="E5E5CB"/>
+                </a:solidFill>
+                <a:ea typeface="Calibri"/>
+                <a:cs typeface="Calibri"/>
+              </a:rPr>
+              <a:t> via </a:t>
+            </a:r>
+            <a:r>
+              <a:rPr lang="de-DE" dirty="0" err="1">
+                <a:solidFill>
+                  <a:srgbClr val="E5E5CB"/>
+                </a:solidFill>
+                <a:ea typeface="Calibri"/>
+                <a:cs typeface="Calibri"/>
+              </a:rPr>
+              <a:t>the</a:t>
+            </a:r>
+            <a:r>
+              <a:rPr lang="de-DE" dirty="0">
+                <a:solidFill>
+                  <a:srgbClr val="E5E5CB"/>
+                </a:solidFill>
+                <a:ea typeface="Calibri"/>
+                <a:cs typeface="Calibri"/>
+              </a:rPr>
+              <a:t> GUI</a:t>
+            </a:r>
+          </a:p>
+          <a:p>
+            <a:pPr lvl="1">
+              <a:buFont typeface="Wingdings" panose="020B0604020202020204" pitchFamily="34" charset="0"/>
+              <a:buChar char="Ø"/>
+            </a:pPr>
+            <a:r>
+              <a:rPr lang="de-DE" dirty="0">
+                <a:solidFill>
+                  <a:srgbClr val="E5E5CB"/>
+                </a:solidFill>
+                <a:ea typeface="Calibri"/>
+                <a:cs typeface="Calibri"/>
+              </a:rPr>
+              <a:t> all </a:t>
+            </a:r>
+            <a:r>
+              <a:rPr lang="de-DE" dirty="0" err="1">
                 <a:solidFill>
                   <a:srgbClr val="E5E5CB"/>
                 </a:solidFill>
@@ -7933,7 +7910,7 @@
               <a:t>images</a:t>
             </a:r>
             <a:r>
-              <a:rPr lang="de-DE">
+              <a:rPr lang="de-DE" dirty="0">
                 <a:solidFill>
                   <a:srgbClr val="E5E5CB"/>
                 </a:solidFill>
@@ -7943,7 +7920,7 @@
               <a:t> </a:t>
             </a:r>
             <a:r>
-              <a:rPr lang="de-DE" err="1">
+              <a:rPr lang="de-DE" dirty="0" err="1">
                 <a:solidFill>
                   <a:srgbClr val="E5E5CB"/>
                 </a:solidFill>
@@ -7953,7 +7930,7 @@
               <a:t>contained</a:t>
             </a:r>
             <a:r>
-              <a:rPr lang="de-DE">
+              <a:rPr lang="de-DE" dirty="0">
                 <a:solidFill>
                   <a:srgbClr val="E5E5CB"/>
                 </a:solidFill>
@@ -7963,7 +7940,7 @@
               <a:t> in </a:t>
             </a:r>
             <a:r>
-              <a:rPr lang="de-DE" err="1">
+              <a:rPr lang="de-DE" dirty="0" err="1">
                 <a:solidFill>
                   <a:srgbClr val="E5E5CB"/>
                 </a:solidFill>
@@ -7973,7 +7950,7 @@
               <a:t>the</a:t>
             </a:r>
             <a:r>
-              <a:rPr lang="de-DE">
+              <a:rPr lang="de-DE" dirty="0">
                 <a:solidFill>
                   <a:srgbClr val="E5E5CB"/>
                 </a:solidFill>
@@ -7983,7 +7960,7 @@
               <a:t> original PDF </a:t>
             </a:r>
             <a:r>
-              <a:rPr lang="de-DE" err="1">
+              <a:rPr lang="de-DE" dirty="0" err="1">
                 <a:solidFill>
                   <a:srgbClr val="E5E5CB"/>
                 </a:solidFill>
@@ -7992,7 +7969,7 @@
               </a:rPr>
               <a:t>file</a:t>
             </a:r>
-            <a:endParaRPr lang="de-DE">
+            <a:endParaRPr lang="de-DE" dirty="0">
               <a:solidFill>
                 <a:srgbClr val="E5E5CB"/>
               </a:solidFill>
@@ -8006,17 +7983,17 @@
               <a:buChar char="Ø"/>
             </a:pPr>
             <a:r>
-              <a:rPr lang="de-DE">
-                <a:solidFill>
-                  <a:srgbClr val="E5E5CB"/>
-                </a:solidFill>
-                <a:ea typeface="Calibri"/>
-                <a:cs typeface="Calibri"/>
-              </a:rPr>
-              <a:t>… </a:t>
-            </a:r>
-            <a:r>
-              <a:rPr lang="de-DE" err="1">
+              <a:rPr lang="de-DE" dirty="0">
+                <a:solidFill>
+                  <a:srgbClr val="E5E5CB"/>
+                </a:solidFill>
+                <a:ea typeface="Calibri"/>
+                <a:cs typeface="Calibri"/>
+              </a:rPr>
+              <a:t> … </a:t>
+            </a:r>
+            <a:r>
+              <a:rPr lang="de-DE" dirty="0" err="1">
                 <a:solidFill>
                   <a:srgbClr val="E5E5CB"/>
                 </a:solidFill>
@@ -8026,7 +8003,7 @@
               <a:t>of</a:t>
             </a:r>
             <a:r>
-              <a:rPr lang="de-DE">
+              <a:rPr lang="de-DE" dirty="0">
                 <a:solidFill>
                   <a:srgbClr val="E5E5CB"/>
                 </a:solidFill>
@@ -8036,7 +8013,7 @@
               <a:t> </a:t>
             </a:r>
             <a:r>
-              <a:rPr lang="de-DE" err="1">
+              <a:rPr lang="de-DE" dirty="0" err="1">
                 <a:solidFill>
                   <a:srgbClr val="E5E5CB"/>
                 </a:solidFill>
@@ -8046,7 +8023,7 @@
               <a:t>every</a:t>
             </a:r>
             <a:r>
-              <a:rPr lang="de-DE">
+              <a:rPr lang="de-DE" dirty="0">
                 <a:solidFill>
                   <a:srgbClr val="E5E5CB"/>
                 </a:solidFill>
@@ -8056,7 +8033,7 @@
               <a:t> PDF </a:t>
             </a:r>
             <a:r>
-              <a:rPr lang="de-DE" err="1">
+              <a:rPr lang="de-DE" dirty="0" err="1">
                 <a:solidFill>
                   <a:srgbClr val="E5E5CB"/>
                 </a:solidFill>
@@ -8066,7 +8043,7 @@
               <a:t>file</a:t>
             </a:r>
             <a:r>
-              <a:rPr lang="de-DE">
+              <a:rPr lang="de-DE" dirty="0">
                 <a:solidFill>
                   <a:srgbClr val="E5E5CB"/>
                 </a:solidFill>
@@ -8076,7 +8053,7 @@
               <a:t> </a:t>
             </a:r>
             <a:r>
-              <a:rPr lang="de-DE" err="1">
+              <a:rPr lang="de-DE" dirty="0" err="1">
                 <a:solidFill>
                   <a:srgbClr val="E5E5CB"/>
                 </a:solidFill>
@@ -8086,7 +8063,7 @@
               <a:t>passed</a:t>
             </a:r>
             <a:r>
-              <a:rPr lang="de-DE">
+              <a:rPr lang="de-DE" dirty="0">
                 <a:solidFill>
                   <a:srgbClr val="E5E5CB"/>
                 </a:solidFill>
@@ -8096,7 +8073,7 @@
               <a:t> </a:t>
             </a:r>
             <a:r>
-              <a:rPr lang="de-DE" err="1">
+              <a:rPr lang="de-DE" dirty="0" err="1">
                 <a:solidFill>
                   <a:srgbClr val="E5E5CB"/>
                 </a:solidFill>
@@ -8106,7 +8083,7 @@
               <a:t>into</a:t>
             </a:r>
             <a:r>
-              <a:rPr lang="de-DE">
+              <a:rPr lang="de-DE" dirty="0">
                 <a:solidFill>
                   <a:srgbClr val="E5E5CB"/>
                 </a:solidFill>
@@ -8117,7 +8094,7 @@
             </a:r>
           </a:p>
           <a:p>
-            <a:endParaRPr lang="de-DE">
+            <a:endParaRPr lang="de-DE" dirty="0">
               <a:solidFill>
                 <a:srgbClr val="E5E5CB"/>
               </a:solidFill>
@@ -8127,7 +8104,7 @@
           </a:p>
           <a:p>
             <a:r>
-              <a:rPr lang="de-DE" err="1">
+              <a:rPr lang="de-DE" dirty="0" err="1">
                 <a:solidFill>
                   <a:srgbClr val="E5E5CB"/>
                 </a:solidFill>
@@ -8137,7 +8114,7 @@
               <a:t>Useful</a:t>
             </a:r>
             <a:r>
-              <a:rPr lang="de-DE">
+              <a:rPr lang="de-DE" dirty="0">
                 <a:solidFill>
                   <a:srgbClr val="E5E5CB"/>
                 </a:solidFill>
@@ -8147,7 +8124,7 @@
               <a:t> </a:t>
             </a:r>
             <a:r>
-              <a:rPr lang="de-DE" err="1">
+              <a:rPr lang="de-DE" dirty="0" err="1">
                 <a:solidFill>
                   <a:srgbClr val="E5E5CB"/>
                 </a:solidFill>
@@ -8157,7 +8134,7 @@
               <a:t>for</a:t>
             </a:r>
             <a:r>
-              <a:rPr lang="de-DE">
+              <a:rPr lang="de-DE" dirty="0">
                 <a:solidFill>
                   <a:srgbClr val="E5E5CB"/>
                 </a:solidFill>
@@ -8167,7 +8144,7 @@
               <a:t> Researchers in all </a:t>
             </a:r>
             <a:r>
-              <a:rPr lang="de-DE" err="1">
+              <a:rPr lang="de-DE" dirty="0" err="1">
                 <a:solidFill>
                   <a:srgbClr val="E5E5CB"/>
                 </a:solidFill>
@@ -8177,7 +8154,7 @@
               <a:t>domains</a:t>
             </a:r>
             <a:r>
-              <a:rPr lang="de-DE">
+              <a:rPr lang="de-DE" dirty="0">
                 <a:solidFill>
                   <a:srgbClr val="E5E5CB"/>
                 </a:solidFill>
@@ -8528,6 +8505,37 @@
                                   </p:childTnLst>
                                 </p:cTn>
                               </p:par>
+                              <p:par>
+                                <p:cTn id="26" presetID="1" presetClass="entr" presetSubtype="0" fill="hold" grpId="0" nodeType="withEffect">
+                                  <p:stCondLst>
+                                    <p:cond delay="0"/>
+                                  </p:stCondLst>
+                                  <p:childTnLst>
+                                    <p:set>
+                                      <p:cBhvr>
+                                        <p:cTn id="27" dur="1" fill="hold">
+                                          <p:stCondLst>
+                                            <p:cond delay="0"/>
+                                          </p:stCondLst>
+                                        </p:cTn>
+                                        <p:tgtEl>
+                                          <p:spTgt spid="9">
+                                            <p:txEl>
+                                              <p:pRg st="11" end="11"/>
+                                            </p:txEl>
+                                          </p:spTgt>
+                                        </p:tgtEl>
+                                        <p:attrNameLst>
+                                          <p:attrName>style.visibility</p:attrName>
+                                        </p:attrNameLst>
+                                      </p:cBhvr>
+                                      <p:to>
+                                        <p:strVal val="visible"/>
+                                      </p:to>
+                                    </p:set>
+                                  </p:childTnLst>
+                                </p:cTn>
+                              </p:par>
                             </p:childTnLst>
                           </p:cTn>
                         </p:par>
@@ -8535,26 +8543,26 @@
                     </p:cTn>
                   </p:par>
                   <p:par>
-                    <p:cTn id="26" fill="hold">
+                    <p:cTn id="28" fill="hold">
                       <p:stCondLst>
                         <p:cond delay="indefinite"/>
                       </p:stCondLst>
                       <p:childTnLst>
                         <p:par>
-                          <p:cTn id="27" fill="hold">
+                          <p:cTn id="29" fill="hold">
                             <p:stCondLst>
                               <p:cond delay="0"/>
                             </p:stCondLst>
                             <p:childTnLst>
                               <p:par>
-                                <p:cTn id="28" presetID="1" presetClass="entr" presetSubtype="0" fill="hold" grpId="0" nodeType="clickEffect">
+                                <p:cTn id="30" presetID="1" presetClass="entr" presetSubtype="0" fill="hold" grpId="0" nodeType="clickEffect">
                                   <p:stCondLst>
                                     <p:cond delay="0"/>
                                   </p:stCondLst>
                                   <p:childTnLst>
                                     <p:set>
                                       <p:cBhvr>
-                                        <p:cTn id="29" dur="1" fill="hold">
+                                        <p:cTn id="31" dur="1" fill="hold">
                                           <p:stCondLst>
                                             <p:cond delay="0"/>
                                           </p:stCondLst>
@@ -8562,7 +8570,7 @@
                                         <p:tgtEl>
                                           <p:spTgt spid="9">
                                             <p:txEl>
-                                              <p:pRg st="12" end="12"/>
+                                              <p:pRg st="13" end="13"/>
                                             </p:txEl>
                                           </p:spTgt>
                                         </p:tgtEl>
@@ -8859,464 +8867,6 @@
 </p:sld>
 </file>
 
-<file path=ppt/slides/slide14.xml><?xml version="1.0" encoding="utf-8"?>
-<p:sld xmlns:a="http://schemas.openxmlformats.org/drawingml/2006/main" xmlns:r="http://schemas.openxmlformats.org/officeDocument/2006/relationships" xmlns:p="http://schemas.openxmlformats.org/presentationml/2006/main" show="0">
-  <p:cSld>
-    <p:bg>
-      <p:bgPr>
-        <a:solidFill>
-          <a:schemeClr val="tx1">
-            <a:lumMod val="75000"/>
-            <a:lumOff val="25000"/>
-          </a:schemeClr>
-        </a:solidFill>
-        <a:effectLst/>
-      </p:bgPr>
-    </p:bg>
-    <p:spTree>
-      <p:nvGrpSpPr>
-        <p:cNvPr id="1" name="">
-          <a:extLst>
-            <a:ext uri="{FF2B5EF4-FFF2-40B4-BE49-F238E27FC236}">
-              <a16:creationId xmlns:a16="http://schemas.microsoft.com/office/drawing/2014/main" id="{077BBBC7-BA3E-81F2-541C-060827BAF3E5}"/>
-            </a:ext>
-          </a:extLst>
-        </p:cNvPr>
-        <p:cNvGrpSpPr/>
-        <p:nvPr/>
-      </p:nvGrpSpPr>
-      <p:grpSpPr>
-        <a:xfrm>
-          <a:off x="0" y="0"/>
-          <a:ext cx="0" cy="0"/>
-          <a:chOff x="0" y="0"/>
-          <a:chExt cx="0" cy="0"/>
-        </a:xfrm>
-      </p:grpSpPr>
-      <p:sp>
-        <p:nvSpPr>
-          <p:cNvPr id="8" name="Titel 7">
-            <a:extLst>
-              <a:ext uri="{FF2B5EF4-FFF2-40B4-BE49-F238E27FC236}">
-                <a16:creationId xmlns:a16="http://schemas.microsoft.com/office/drawing/2014/main" id="{39BC0FE3-1002-25DF-0C56-5E35549890DA}"/>
-              </a:ext>
-            </a:extLst>
-          </p:cNvPr>
-          <p:cNvSpPr>
-            <a:spLocks noGrp="1"/>
-          </p:cNvSpPr>
-          <p:nvPr>
-            <p:ph type="title"/>
-          </p:nvPr>
-        </p:nvSpPr>
-        <p:spPr/>
-        <p:txBody>
-          <a:bodyPr/>
-          <a:lstStyle/>
-          <a:p>
-            <a:r>
-              <a:rPr lang="de-DE" b="1">
-                <a:solidFill>
-                  <a:srgbClr val="E5E5CB"/>
-                </a:solidFill>
-                <a:ea typeface="Calibri Light"/>
-                <a:cs typeface="Calibri Light"/>
-              </a:rPr>
-              <a:t>Automation Helper </a:t>
-            </a:r>
-            <a:r>
-              <a:rPr lang="de-DE" b="1" err="1">
-                <a:solidFill>
-                  <a:srgbClr val="E5E5CB"/>
-                </a:solidFill>
-                <a:ea typeface="Calibri Light"/>
-                <a:cs typeface="Calibri Light"/>
-              </a:rPr>
-              <a:t>for</a:t>
-            </a:r>
-            <a:r>
-              <a:rPr lang="de-DE" b="1">
-                <a:solidFill>
-                  <a:srgbClr val="E5E5CB"/>
-                </a:solidFill>
-                <a:ea typeface="Calibri Light"/>
-                <a:cs typeface="Calibri Light"/>
-              </a:rPr>
-              <a:t> </a:t>
-            </a:r>
-            <a:r>
-              <a:rPr lang="de-DE" b="1" err="1">
-                <a:solidFill>
-                  <a:srgbClr val="E5E5CB"/>
-                </a:solidFill>
-                <a:ea typeface="Calibri Light"/>
-                <a:cs typeface="Calibri Light"/>
-              </a:rPr>
-              <a:t>Literature</a:t>
-            </a:r>
-            <a:r>
-              <a:rPr lang="de-DE" b="1">
-                <a:solidFill>
-                  <a:srgbClr val="E5E5CB"/>
-                </a:solidFill>
-                <a:ea typeface="Calibri Light"/>
-                <a:cs typeface="Calibri Light"/>
-              </a:rPr>
-              <a:t> Reviews</a:t>
-            </a:r>
-            <a:endParaRPr lang="de-DE">
-              <a:solidFill>
-                <a:srgbClr val="E5E5CB"/>
-              </a:solidFill>
-              <a:ea typeface="Calibri Light"/>
-              <a:cs typeface="Calibri Light"/>
-            </a:endParaRPr>
-          </a:p>
-          <a:p>
-            <a:endParaRPr lang="de-DE">
-              <a:ea typeface="Calibri Light"/>
-              <a:cs typeface="Calibri Light"/>
-            </a:endParaRPr>
-          </a:p>
-        </p:txBody>
-      </p:sp>
-      <p:sp>
-        <p:nvSpPr>
-          <p:cNvPr id="2" name="Textfeld 1">
-            <a:extLst>
-              <a:ext uri="{FF2B5EF4-FFF2-40B4-BE49-F238E27FC236}">
-                <a16:creationId xmlns:a16="http://schemas.microsoft.com/office/drawing/2014/main" id="{5C2C79A8-0D15-80F3-B6CC-18603E1C846F}"/>
-              </a:ext>
-            </a:extLst>
-          </p:cNvPr>
-          <p:cNvSpPr txBox="1"/>
-          <p:nvPr/>
-        </p:nvSpPr>
-        <p:spPr>
-          <a:xfrm>
-            <a:off x="838831" y="1814486"/>
-            <a:ext cx="10513915" cy="2031325"/>
-          </a:xfrm>
-          <a:prstGeom prst="rect">
-            <a:avLst/>
-          </a:prstGeom>
-          <a:noFill/>
-        </p:spPr>
-        <p:txBody>
-          <a:bodyPr rot="0" spcFirstLastPara="0" vertOverflow="overflow" horzOverflow="overflow" vert="horz" wrap="square" lIns="91440" tIns="45720" rIns="91440" bIns="45720" numCol="1" spcCol="0" rtlCol="0" fromWordArt="0" anchor="t" anchorCtr="0" forceAA="0" compatLnSpc="1">
-            <a:prstTxWarp prst="textNoShape">
-              <a:avLst/>
-            </a:prstTxWarp>
-            <a:spAutoFit/>
-          </a:bodyPr>
-          <a:lstStyle/>
-          <a:p>
-            <a:r>
-              <a:rPr lang="de-DE">
-                <a:solidFill>
-                  <a:srgbClr val="E5E5CB"/>
-                </a:solidFill>
-                <a:ea typeface="+mn-lt"/>
-                <a:cs typeface="+mn-lt"/>
-              </a:rPr>
-              <a:t>● GUI Framework: Kaan? </a:t>
-            </a:r>
-            <a:r>
-              <a:rPr lang="de-DE" err="1">
-                <a:solidFill>
-                  <a:srgbClr val="E5E5CB"/>
-                </a:solidFill>
-                <a:ea typeface="+mn-lt"/>
-                <a:cs typeface="+mn-lt"/>
-              </a:rPr>
-              <a:t>CustomTkinter</a:t>
-            </a:r>
-            <a:r>
-              <a:rPr lang="de-DE">
-                <a:solidFill>
-                  <a:srgbClr val="E5E5CB"/>
-                </a:solidFill>
-                <a:ea typeface="+mn-lt"/>
-                <a:cs typeface="+mn-lt"/>
-              </a:rPr>
-              <a:t>?</a:t>
-            </a:r>
-            <a:endParaRPr lang="de-DE"/>
-          </a:p>
-          <a:p>
-            <a:r>
-              <a:rPr lang="de-DE">
-                <a:solidFill>
-                  <a:srgbClr val="E5E5CB"/>
-                </a:solidFill>
-                <a:ea typeface="+mn-lt"/>
-                <a:cs typeface="+mn-lt"/>
-              </a:rPr>
-              <a:t>● Data Handling: David?</a:t>
-            </a:r>
-          </a:p>
-          <a:p>
-            <a:r>
-              <a:rPr lang="de-DE">
-                <a:solidFill>
-                  <a:srgbClr val="E5E5CB"/>
-                </a:solidFill>
-                <a:ea typeface="+mn-lt"/>
-                <a:cs typeface="+mn-lt"/>
-              </a:rPr>
-              <a:t>● Embedding Models: David?</a:t>
-            </a:r>
-          </a:p>
-          <a:p>
-            <a:r>
-              <a:rPr lang="de-DE">
-                <a:solidFill>
-                  <a:srgbClr val="E5E5CB"/>
-                </a:solidFill>
-                <a:ea typeface="+mn-lt"/>
-                <a:cs typeface="+mn-lt"/>
-              </a:rPr>
-              <a:t>● Large Language Model (LLM): David?</a:t>
-            </a:r>
-          </a:p>
-          <a:p>
-            <a:r>
-              <a:rPr lang="de-DE">
-                <a:solidFill>
-                  <a:srgbClr val="E5E5CB"/>
-                </a:solidFill>
-                <a:ea typeface="+mn-lt"/>
-                <a:cs typeface="+mn-lt"/>
-              </a:rPr>
-              <a:t>● Database </a:t>
-            </a:r>
-            <a:r>
-              <a:rPr lang="de-DE" err="1">
-                <a:solidFill>
-                  <a:srgbClr val="E5E5CB"/>
-                </a:solidFill>
-                <a:ea typeface="+mn-lt"/>
-                <a:cs typeface="+mn-lt"/>
-              </a:rPr>
-              <a:t>Utilization</a:t>
-            </a:r>
-            <a:r>
-              <a:rPr lang="de-DE">
-                <a:solidFill>
-                  <a:srgbClr val="E5E5CB"/>
-                </a:solidFill>
-                <a:ea typeface="+mn-lt"/>
-                <a:cs typeface="+mn-lt"/>
-              </a:rPr>
-              <a:t>: -</a:t>
-            </a:r>
-          </a:p>
-          <a:p>
-            <a:r>
-              <a:rPr lang="de-DE">
-                <a:solidFill>
-                  <a:srgbClr val="E5E5CB"/>
-                </a:solidFill>
-                <a:ea typeface="+mn-lt"/>
-                <a:cs typeface="+mn-lt"/>
-              </a:rPr>
-              <a:t>● </a:t>
-            </a:r>
-            <a:r>
-              <a:rPr lang="de-DE" err="1">
-                <a:solidFill>
-                  <a:srgbClr val="E5E5CB"/>
-                </a:solidFill>
-                <a:ea typeface="+mn-lt"/>
-                <a:cs typeface="+mn-lt"/>
-              </a:rPr>
-              <a:t>LangChain</a:t>
-            </a:r>
-            <a:r>
-              <a:rPr lang="de-DE">
-                <a:solidFill>
-                  <a:srgbClr val="E5E5CB"/>
-                </a:solidFill>
-                <a:ea typeface="+mn-lt"/>
-                <a:cs typeface="+mn-lt"/>
-              </a:rPr>
-              <a:t>: David?</a:t>
-            </a:r>
-          </a:p>
-          <a:p>
-            <a:r>
-              <a:rPr lang="de-DE">
-                <a:solidFill>
-                  <a:srgbClr val="E5E5CB"/>
-                </a:solidFill>
-                <a:ea typeface="+mn-lt"/>
-                <a:cs typeface="+mn-lt"/>
-              </a:rPr>
-              <a:t>● Challenges and Solutions: Share </a:t>
-            </a:r>
-            <a:r>
-              <a:rPr lang="de-DE" err="1">
-                <a:solidFill>
-                  <a:srgbClr val="E5E5CB"/>
-                </a:solidFill>
-                <a:ea typeface="+mn-lt"/>
-                <a:cs typeface="+mn-lt"/>
-              </a:rPr>
-              <a:t>significant</a:t>
-            </a:r>
-            <a:r>
-              <a:rPr lang="de-DE">
-                <a:solidFill>
-                  <a:srgbClr val="E5E5CB"/>
-                </a:solidFill>
-                <a:ea typeface="+mn-lt"/>
-                <a:cs typeface="+mn-lt"/>
-              </a:rPr>
-              <a:t> </a:t>
-            </a:r>
-            <a:r>
-              <a:rPr lang="de-DE" err="1">
-                <a:solidFill>
-                  <a:srgbClr val="E5E5CB"/>
-                </a:solidFill>
-                <a:ea typeface="+mn-lt"/>
-                <a:cs typeface="+mn-lt"/>
-              </a:rPr>
-              <a:t>challenges</a:t>
-            </a:r>
-            <a:r>
-              <a:rPr lang="de-DE">
-                <a:solidFill>
-                  <a:srgbClr val="E5E5CB"/>
-                </a:solidFill>
-                <a:ea typeface="+mn-lt"/>
-                <a:cs typeface="+mn-lt"/>
-              </a:rPr>
-              <a:t> </a:t>
-            </a:r>
-            <a:r>
-              <a:rPr lang="de-DE" err="1">
-                <a:solidFill>
-                  <a:srgbClr val="E5E5CB"/>
-                </a:solidFill>
-                <a:ea typeface="+mn-lt"/>
-                <a:cs typeface="+mn-lt"/>
-              </a:rPr>
-              <a:t>encountered</a:t>
-            </a:r>
-            <a:r>
-              <a:rPr lang="de-DE">
-                <a:solidFill>
-                  <a:srgbClr val="E5E5CB"/>
-                </a:solidFill>
-                <a:ea typeface="+mn-lt"/>
-                <a:cs typeface="+mn-lt"/>
-              </a:rPr>
-              <a:t> and </a:t>
-            </a:r>
-            <a:r>
-              <a:rPr lang="de-DE" err="1">
-                <a:solidFill>
-                  <a:srgbClr val="E5E5CB"/>
-                </a:solidFill>
-                <a:ea typeface="+mn-lt"/>
-                <a:cs typeface="+mn-lt"/>
-              </a:rPr>
-              <a:t>how</a:t>
-            </a:r>
-            <a:r>
-              <a:rPr lang="de-DE">
-                <a:solidFill>
-                  <a:srgbClr val="E5E5CB"/>
-                </a:solidFill>
-                <a:ea typeface="+mn-lt"/>
-                <a:cs typeface="+mn-lt"/>
-              </a:rPr>
-              <a:t> </a:t>
-            </a:r>
-            <a:r>
-              <a:rPr lang="de-DE" err="1">
-                <a:solidFill>
-                  <a:srgbClr val="E5E5CB"/>
-                </a:solidFill>
-                <a:ea typeface="+mn-lt"/>
-                <a:cs typeface="+mn-lt"/>
-              </a:rPr>
-              <a:t>they</a:t>
-            </a:r>
-            <a:r>
-              <a:rPr lang="de-DE">
-                <a:solidFill>
-                  <a:srgbClr val="E5E5CB"/>
-                </a:solidFill>
-                <a:ea typeface="+mn-lt"/>
-                <a:cs typeface="+mn-lt"/>
-              </a:rPr>
-              <a:t> </a:t>
-            </a:r>
-            <a:r>
-              <a:rPr lang="de-DE" err="1">
-                <a:solidFill>
-                  <a:srgbClr val="E5E5CB"/>
-                </a:solidFill>
-                <a:ea typeface="+mn-lt"/>
-                <a:cs typeface="+mn-lt"/>
-              </a:rPr>
-              <a:t>were</a:t>
-            </a:r>
-            <a:r>
-              <a:rPr lang="de-DE">
-                <a:solidFill>
-                  <a:srgbClr val="E5E5CB"/>
-                </a:solidFill>
-                <a:ea typeface="+mn-lt"/>
-                <a:cs typeface="+mn-lt"/>
-              </a:rPr>
-              <a:t> </a:t>
-            </a:r>
-            <a:r>
-              <a:rPr lang="de-DE" err="1">
-                <a:solidFill>
-                  <a:srgbClr val="E5E5CB"/>
-                </a:solidFill>
-                <a:ea typeface="+mn-lt"/>
-                <a:cs typeface="+mn-lt"/>
-              </a:rPr>
-              <a:t>resolved</a:t>
-            </a:r>
-            <a:r>
-              <a:rPr lang="de-DE">
-                <a:solidFill>
-                  <a:srgbClr val="E5E5CB"/>
-                </a:solidFill>
-                <a:ea typeface="+mn-lt"/>
-                <a:cs typeface="+mn-lt"/>
-              </a:rPr>
-              <a:t>.</a:t>
-            </a:r>
-            <a:endParaRPr lang="de-DE">
-              <a:solidFill>
-                <a:srgbClr val="E5E5CB"/>
-              </a:solidFill>
-              <a:ea typeface="Calibri"/>
-              <a:cs typeface="Calibri"/>
-            </a:endParaRPr>
-          </a:p>
-        </p:txBody>
-      </p:sp>
-    </p:spTree>
-    <p:extLst>
-      <p:ext uri="{BB962C8B-B14F-4D97-AF65-F5344CB8AC3E}">
-        <p14:creationId xmlns:p14="http://schemas.microsoft.com/office/powerpoint/2010/main" val="2120717204"/>
-      </p:ext>
-    </p:extLst>
-  </p:cSld>
-  <p:clrMapOvr>
-    <a:masterClrMapping/>
-  </p:clrMapOvr>
-</p:sld>
-</file>
-
 <file path=ppt/slides/slide2.xml><?xml version="1.0" encoding="utf-8"?>
 <p:sld xmlns:a="http://schemas.openxmlformats.org/drawingml/2006/main" xmlns:r="http://schemas.openxmlformats.org/officeDocument/2006/relationships" xmlns:p="http://schemas.openxmlformats.org/presentationml/2006/main">
   <p:cSld>
@@ -9453,7 +9003,7 @@
             <a:avLst/>
           </a:prstGeom>
           <a:blipFill dpi="0" rotWithShape="1">
-            <a:blip r:embed="rId2">
+            <a:blip r:embed="rId2" cstate="print">
               <a:extLst>
                 <a:ext uri="{28A0092B-C50C-407E-A947-70E740481C1C}">
                   <a14:useLocalDpi xmlns:a14="http://schemas.microsoft.com/office/drawing/2010/main" val="0"/>

</xml_diff>